<commit_message>
CSHL biostat course self-paced version update
</commit_message>
<xml_diff>
--- a/images/course_logo.pptx
+++ b/images/course_logo.pptx
@@ -6,6 +6,7 @@
   </p:sldMasterIdLst>
   <p:sldIdLst>
     <p:sldId id="256" r:id="rId2"/>
+    <p:sldId id="257" r:id="rId3"/>
   </p:sldIdLst>
   <p:sldSz cx="12192000" cy="6858000"/>
   <p:notesSz cx="6858000" cy="9144000"/>
@@ -104,6 +105,11 @@
       </a:defRPr>
     </a:lvl9pPr>
   </p:defaultTextStyle>
+  <p:extLst>
+    <p:ext uri="{EFAFB233-063F-42B5-8137-9DF3F51BA10A}">
+      <p15:sldGuideLst xmlns:p15="http://schemas.microsoft.com/office/powerpoint/2012/main"/>
+    </p:ext>
+  </p:extLst>
 </p:presentation>
 </file>
 
@@ -254,7 +260,7 @@
           <a:p>
             <a:fld id="{56537B30-4BC5-D14D-B54B-EB00AB7C0EAC}" type="datetimeFigureOut">
               <a:rPr lang="en-US" smtClean="0"/>
-              <a:t>6/30/24</a:t>
+              <a:t>7/31/24</a:t>
             </a:fld>
             <a:endParaRPr lang="en-US"/>
           </a:p>
@@ -452,7 +458,7 @@
           <a:p>
             <a:fld id="{56537B30-4BC5-D14D-B54B-EB00AB7C0EAC}" type="datetimeFigureOut">
               <a:rPr lang="en-US" smtClean="0"/>
-              <a:t>6/30/24</a:t>
+              <a:t>7/31/24</a:t>
             </a:fld>
             <a:endParaRPr lang="en-US"/>
           </a:p>
@@ -660,7 +666,7 @@
           <a:p>
             <a:fld id="{56537B30-4BC5-D14D-B54B-EB00AB7C0EAC}" type="datetimeFigureOut">
               <a:rPr lang="en-US" smtClean="0"/>
-              <a:t>6/30/24</a:t>
+              <a:t>7/31/24</a:t>
             </a:fld>
             <a:endParaRPr lang="en-US"/>
           </a:p>
@@ -858,7 +864,7 @@
           <a:p>
             <a:fld id="{56537B30-4BC5-D14D-B54B-EB00AB7C0EAC}" type="datetimeFigureOut">
               <a:rPr lang="en-US" smtClean="0"/>
-              <a:t>6/30/24</a:t>
+              <a:t>7/31/24</a:t>
             </a:fld>
             <a:endParaRPr lang="en-US"/>
           </a:p>
@@ -1133,7 +1139,7 @@
           <a:p>
             <a:fld id="{56537B30-4BC5-D14D-B54B-EB00AB7C0EAC}" type="datetimeFigureOut">
               <a:rPr lang="en-US" smtClean="0"/>
-              <a:t>6/30/24</a:t>
+              <a:t>7/31/24</a:t>
             </a:fld>
             <a:endParaRPr lang="en-US"/>
           </a:p>
@@ -1398,7 +1404,7 @@
           <a:p>
             <a:fld id="{56537B30-4BC5-D14D-B54B-EB00AB7C0EAC}" type="datetimeFigureOut">
               <a:rPr lang="en-US" smtClean="0"/>
-              <a:t>6/30/24</a:t>
+              <a:t>7/31/24</a:t>
             </a:fld>
             <a:endParaRPr lang="en-US"/>
           </a:p>
@@ -1810,7 +1816,7 @@
           <a:p>
             <a:fld id="{56537B30-4BC5-D14D-B54B-EB00AB7C0EAC}" type="datetimeFigureOut">
               <a:rPr lang="en-US" smtClean="0"/>
-              <a:t>6/30/24</a:t>
+              <a:t>7/31/24</a:t>
             </a:fld>
             <a:endParaRPr lang="en-US"/>
           </a:p>
@@ -1951,7 +1957,7 @@
           <a:p>
             <a:fld id="{56537B30-4BC5-D14D-B54B-EB00AB7C0EAC}" type="datetimeFigureOut">
               <a:rPr lang="en-US" smtClean="0"/>
-              <a:t>6/30/24</a:t>
+              <a:t>7/31/24</a:t>
             </a:fld>
             <a:endParaRPr lang="en-US"/>
           </a:p>
@@ -2064,7 +2070,7 @@
           <a:p>
             <a:fld id="{56537B30-4BC5-D14D-B54B-EB00AB7C0EAC}" type="datetimeFigureOut">
               <a:rPr lang="en-US" smtClean="0"/>
-              <a:t>6/30/24</a:t>
+              <a:t>7/31/24</a:t>
             </a:fld>
             <a:endParaRPr lang="en-US"/>
           </a:p>
@@ -2375,7 +2381,7 @@
           <a:p>
             <a:fld id="{56537B30-4BC5-D14D-B54B-EB00AB7C0EAC}" type="datetimeFigureOut">
               <a:rPr lang="en-US" smtClean="0"/>
-              <a:t>6/30/24</a:t>
+              <a:t>7/31/24</a:t>
             </a:fld>
             <a:endParaRPr lang="en-US"/>
           </a:p>
@@ -2663,7 +2669,7 @@
           <a:p>
             <a:fld id="{56537B30-4BC5-D14D-B54B-EB00AB7C0EAC}" type="datetimeFigureOut">
               <a:rPr lang="en-US" smtClean="0"/>
-              <a:t>6/30/24</a:t>
+              <a:t>7/31/24</a:t>
             </a:fld>
             <a:endParaRPr lang="en-US"/>
           </a:p>
@@ -2904,7 +2910,7 @@
           <a:p>
             <a:fld id="{56537B30-4BC5-D14D-B54B-EB00AB7C0EAC}" type="datetimeFigureOut">
               <a:rPr lang="en-US" smtClean="0"/>
-              <a:t>6/30/24</a:t>
+              <a:t>7/31/24</a:t>
             </a:fld>
             <a:endParaRPr lang="en-US"/>
           </a:p>
@@ -3469,6 +3475,213 @@
 </p:sld>
 </file>
 
+<file path=ppt/slides/slide2.xml><?xml version="1.0" encoding="utf-8"?>
+<p:sld xmlns:a="http://schemas.openxmlformats.org/drawingml/2006/main" xmlns:r="http://schemas.openxmlformats.org/officeDocument/2006/relationships" xmlns:p="http://schemas.openxmlformats.org/presentationml/2006/main">
+  <p:cSld>
+    <p:spTree>
+      <p:nvGrpSpPr>
+        <p:cNvPr id="1" name=""/>
+        <p:cNvGrpSpPr/>
+        <p:nvPr/>
+      </p:nvGrpSpPr>
+      <p:grpSpPr>
+        <a:xfrm>
+          <a:off x="0" y="0"/>
+          <a:ext cx="0" cy="0"/>
+          <a:chOff x="0" y="0"/>
+          <a:chExt cx="0" cy="0"/>
+        </a:xfrm>
+      </p:grpSpPr>
+      <p:grpSp>
+        <p:nvGrpSpPr>
+          <p:cNvPr id="13" name="Group 12">
+            <a:extLst>
+              <a:ext uri="{FF2B5EF4-FFF2-40B4-BE49-F238E27FC236}">
+                <a16:creationId xmlns:a16="http://schemas.microsoft.com/office/drawing/2014/main" id="{6BEBD6BF-5B4C-37DA-A917-3956238FC889}"/>
+              </a:ext>
+            </a:extLst>
+          </p:cNvPr>
+          <p:cNvGrpSpPr/>
+          <p:nvPr/>
+        </p:nvGrpSpPr>
+        <p:grpSpPr>
+          <a:xfrm>
+            <a:off x="-1" y="952500"/>
+            <a:ext cx="12192001" cy="4952999"/>
+            <a:chOff x="-1" y="952500"/>
+            <a:chExt cx="12192001" cy="4952999"/>
+          </a:xfrm>
+        </p:grpSpPr>
+        <p:pic>
+          <p:nvPicPr>
+            <p:cNvPr id="6" name="Picture 5">
+              <a:extLst>
+                <a:ext uri="{FF2B5EF4-FFF2-40B4-BE49-F238E27FC236}">
+                  <a16:creationId xmlns:a16="http://schemas.microsoft.com/office/drawing/2014/main" id="{FC25E945-F3C6-EBCB-0BE8-BB7338606B03}"/>
+                </a:ext>
+              </a:extLst>
+            </p:cNvPr>
+            <p:cNvPicPr>
+              <a:picLocks noChangeAspect="1"/>
+            </p:cNvPicPr>
+            <p:nvPr/>
+          </p:nvPicPr>
+          <p:blipFill>
+            <a:blip r:embed="rId2"/>
+            <a:stretch>
+              <a:fillRect/>
+            </a:stretch>
+          </p:blipFill>
+          <p:spPr>
+            <a:xfrm>
+              <a:off x="0" y="952500"/>
+              <a:ext cx="12192000" cy="4952999"/>
+            </a:xfrm>
+            <a:prstGeom prst="rect">
+              <a:avLst/>
+            </a:prstGeom>
+          </p:spPr>
+        </p:pic>
+        <p:sp>
+          <p:nvSpPr>
+            <p:cNvPr id="7" name="Rectangle 6">
+              <a:extLst>
+                <a:ext uri="{FF2B5EF4-FFF2-40B4-BE49-F238E27FC236}">
+                  <a16:creationId xmlns:a16="http://schemas.microsoft.com/office/drawing/2014/main" id="{4F425D01-E9EF-F595-EAF6-5E6480ACDB8A}"/>
+                </a:ext>
+              </a:extLst>
+            </p:cNvPr>
+            <p:cNvSpPr/>
+            <p:nvPr/>
+          </p:nvSpPr>
+          <p:spPr>
+            <a:xfrm>
+              <a:off x="-1" y="952500"/>
+              <a:ext cx="12191999" cy="4952999"/>
+            </a:xfrm>
+            <a:prstGeom prst="rect">
+              <a:avLst/>
+            </a:prstGeom>
+            <a:solidFill>
+              <a:schemeClr val="tx1">
+                <a:alpha val="71659"/>
+              </a:schemeClr>
+            </a:solidFill>
+            <a:ln>
+              <a:noFill/>
+            </a:ln>
+          </p:spPr>
+          <p:style>
+            <a:lnRef idx="2">
+              <a:schemeClr val="accent1">
+                <a:shade val="15000"/>
+              </a:schemeClr>
+            </a:lnRef>
+            <a:fillRef idx="1">
+              <a:schemeClr val="accent1"/>
+            </a:fillRef>
+            <a:effectRef idx="0">
+              <a:schemeClr val="accent1"/>
+            </a:effectRef>
+            <a:fontRef idx="minor">
+              <a:schemeClr val="lt1"/>
+            </a:fontRef>
+          </p:style>
+          <p:txBody>
+            <a:bodyPr rtlCol="0" anchor="ctr"/>
+            <a:lstStyle/>
+            <a:p>
+              <a:pPr algn="ctr"/>
+              <a:endParaRPr lang="en-US" dirty="0"/>
+            </a:p>
+          </p:txBody>
+        </p:sp>
+        <p:sp>
+          <p:nvSpPr>
+            <p:cNvPr id="8" name="TextBox 7">
+              <a:extLst>
+                <a:ext uri="{FF2B5EF4-FFF2-40B4-BE49-F238E27FC236}">
+                  <a16:creationId xmlns:a16="http://schemas.microsoft.com/office/drawing/2014/main" id="{016062FC-8D58-CF70-B2F8-8C6143EC5012}"/>
+                </a:ext>
+              </a:extLst>
+            </p:cNvPr>
+            <p:cNvSpPr txBox="1"/>
+            <p:nvPr/>
+          </p:nvSpPr>
+          <p:spPr>
+            <a:xfrm>
+              <a:off x="3075780" y="3044278"/>
+              <a:ext cx="6040436" cy="769441"/>
+            </a:xfrm>
+            <a:prstGeom prst="rect">
+              <a:avLst/>
+            </a:prstGeom>
+            <a:noFill/>
+          </p:spPr>
+          <p:txBody>
+            <a:bodyPr wrap="none" rtlCol="0">
+              <a:spAutoFit/>
+            </a:bodyPr>
+            <a:lstStyle/>
+            <a:p>
+              <a:r>
+                <a:rPr lang="en-US" sz="4400" dirty="0">
+                  <a:solidFill>
+                    <a:schemeClr val="bg1"/>
+                  </a:solidFill>
+                  <a:latin typeface="Pretendard Variable Medium" panose="02000003000000020004" pitchFamily="2" charset="-127"/>
+                  <a:ea typeface="Pretendard Variable Medium" panose="02000003000000020004" pitchFamily="2" charset="-127"/>
+                  <a:cs typeface="Pretendard Variable Medium" panose="02000003000000020004" pitchFamily="2" charset="-127"/>
+                </a:rPr>
+                <a:t>INTRO TO STATISTICS</a:t>
+              </a:r>
+            </a:p>
+          </p:txBody>
+        </p:sp>
+        <p:pic>
+          <p:nvPicPr>
+            <p:cNvPr id="12" name="Picture 11">
+              <a:extLst>
+                <a:ext uri="{FF2B5EF4-FFF2-40B4-BE49-F238E27FC236}">
+                  <a16:creationId xmlns:a16="http://schemas.microsoft.com/office/drawing/2014/main" id="{27189EC3-D9B9-0497-6EDE-88265B32EF3C}"/>
+                </a:ext>
+              </a:extLst>
+            </p:cNvPr>
+            <p:cNvPicPr>
+              <a:picLocks noChangeAspect="1"/>
+            </p:cNvPicPr>
+            <p:nvPr/>
+          </p:nvPicPr>
+          <p:blipFill>
+            <a:blip r:embed="rId3"/>
+            <a:stretch>
+              <a:fillRect/>
+            </a:stretch>
+          </p:blipFill>
+          <p:spPr>
+            <a:xfrm>
+              <a:off x="4301491" y="4290557"/>
+              <a:ext cx="3589018" cy="626654"/>
+            </a:xfrm>
+            <a:prstGeom prst="rect">
+              <a:avLst/>
+            </a:prstGeom>
+          </p:spPr>
+        </p:pic>
+      </p:grpSp>
+    </p:spTree>
+    <p:extLst>
+      <p:ext uri="{BB962C8B-B14F-4D97-AF65-F5344CB8AC3E}">
+        <p14:creationId xmlns:p14="http://schemas.microsoft.com/office/powerpoint/2010/main" val="3519445841"/>
+      </p:ext>
+    </p:extLst>
+  </p:cSld>
+  <p:clrMapOvr>
+    <a:masterClrMapping/>
+  </p:clrMapOvr>
+</p:sld>
+</file>
+
 <file path=ppt/theme/theme1.xml><?xml version="1.0" encoding="utf-8"?>
 <a:theme xmlns:a="http://schemas.openxmlformats.org/drawingml/2006/main" name="Office Theme">
   <a:themeElements>

</xml_diff>